<commit_message>
Add new presentation and reference documents on legal knowledge graphs
</commit_message>
<xml_diff>
--- a/Praxis/Identifying Inconsistencies and Incompleteness in Documents.pptx
+++ b/Praxis/Identifying Inconsistencies and Incompleteness in Documents.pptx
@@ -15409,7 +15409,7 @@
           <a:p>
             <a:fld id="{84D0E6BA-C896-4F66-AC39-BCF86AB0AE0D}" type="datetimeFigureOut">
               <a:rPr lang="en-US" smtClean="0"/>
-              <a:t>12/1/2024</a:t>
+              <a:t>12/9/2024</a:t>
             </a:fld>
             <a:endParaRPr lang="en-US"/>
           </a:p>
@@ -15607,7 +15607,7 @@
           <a:p>
             <a:fld id="{84D0E6BA-C896-4F66-AC39-BCF86AB0AE0D}" type="datetimeFigureOut">
               <a:rPr lang="en-US" smtClean="0"/>
-              <a:t>12/1/2024</a:t>
+              <a:t>12/9/2024</a:t>
             </a:fld>
             <a:endParaRPr lang="en-US"/>
           </a:p>
@@ -15815,7 +15815,7 @@
           <a:p>
             <a:fld id="{84D0E6BA-C896-4F66-AC39-BCF86AB0AE0D}" type="datetimeFigureOut">
               <a:rPr lang="en-US" smtClean="0"/>
-              <a:t>12/1/2024</a:t>
+              <a:t>12/9/2024</a:t>
             </a:fld>
             <a:endParaRPr lang="en-US"/>
           </a:p>
@@ -16013,7 +16013,7 @@
           <a:p>
             <a:fld id="{84D0E6BA-C896-4F66-AC39-BCF86AB0AE0D}" type="datetimeFigureOut">
               <a:rPr lang="en-US" smtClean="0"/>
-              <a:t>12/1/2024</a:t>
+              <a:t>12/9/2024</a:t>
             </a:fld>
             <a:endParaRPr lang="en-US"/>
           </a:p>
@@ -16288,7 +16288,7 @@
           <a:p>
             <a:fld id="{84D0E6BA-C896-4F66-AC39-BCF86AB0AE0D}" type="datetimeFigureOut">
               <a:rPr lang="en-US" smtClean="0"/>
-              <a:t>12/1/2024</a:t>
+              <a:t>12/9/2024</a:t>
             </a:fld>
             <a:endParaRPr lang="en-US"/>
           </a:p>
@@ -16553,7 +16553,7 @@
           <a:p>
             <a:fld id="{84D0E6BA-C896-4F66-AC39-BCF86AB0AE0D}" type="datetimeFigureOut">
               <a:rPr lang="en-US" smtClean="0"/>
-              <a:t>12/1/2024</a:t>
+              <a:t>12/9/2024</a:t>
             </a:fld>
             <a:endParaRPr lang="en-US"/>
           </a:p>
@@ -16965,7 +16965,7 @@
           <a:p>
             <a:fld id="{84D0E6BA-C896-4F66-AC39-BCF86AB0AE0D}" type="datetimeFigureOut">
               <a:rPr lang="en-US" smtClean="0"/>
-              <a:t>12/1/2024</a:t>
+              <a:t>12/9/2024</a:t>
             </a:fld>
             <a:endParaRPr lang="en-US"/>
           </a:p>
@@ -17106,7 +17106,7 @@
           <a:p>
             <a:fld id="{84D0E6BA-C896-4F66-AC39-BCF86AB0AE0D}" type="datetimeFigureOut">
               <a:rPr lang="en-US" smtClean="0"/>
-              <a:t>12/1/2024</a:t>
+              <a:t>12/9/2024</a:t>
             </a:fld>
             <a:endParaRPr lang="en-US"/>
           </a:p>
@@ -17219,7 +17219,7 @@
           <a:p>
             <a:fld id="{84D0E6BA-C896-4F66-AC39-BCF86AB0AE0D}" type="datetimeFigureOut">
               <a:rPr lang="en-US" smtClean="0"/>
-              <a:t>12/1/2024</a:t>
+              <a:t>12/9/2024</a:t>
             </a:fld>
             <a:endParaRPr lang="en-US"/>
           </a:p>
@@ -17530,7 +17530,7 @@
           <a:p>
             <a:fld id="{84D0E6BA-C896-4F66-AC39-BCF86AB0AE0D}" type="datetimeFigureOut">
               <a:rPr lang="en-US" smtClean="0"/>
-              <a:t>12/1/2024</a:t>
+              <a:t>12/9/2024</a:t>
             </a:fld>
             <a:endParaRPr lang="en-US"/>
           </a:p>
@@ -17818,7 +17818,7 @@
           <a:p>
             <a:fld id="{84D0E6BA-C896-4F66-AC39-BCF86AB0AE0D}" type="datetimeFigureOut">
               <a:rPr lang="en-US" smtClean="0"/>
-              <a:t>12/1/2024</a:t>
+              <a:t>12/9/2024</a:t>
             </a:fld>
             <a:endParaRPr lang="en-US"/>
           </a:p>
@@ -18059,7 +18059,7 @@
           <a:p>
             <a:fld id="{84D0E6BA-C896-4F66-AC39-BCF86AB0AE0D}" type="datetimeFigureOut">
               <a:rPr lang="en-US" smtClean="0"/>
-              <a:t>12/1/2024</a:t>
+              <a:t>12/9/2024</a:t>
             </a:fld>
             <a:endParaRPr lang="en-US"/>
           </a:p>
@@ -27653,7 +27653,7 @@
             </a:r>
             <a:r>
               <a:rPr lang="en-US" dirty="0" err="1"/>
-              <a:t>dcsion</a:t>
+              <a:t>decsion</a:t>
             </a:r>
             <a:r>
               <a:rPr lang="en-US" dirty="0"/>
@@ -27684,13 +27684,8 @@
             <a:pPr lvl="1"/>
             <a:r>
               <a:rPr lang="en-US" dirty="0"/>
-              <a:t>Frames curated by transformers as new </a:t>
+              <a:t>Frames curated by transformers as new knowledge appears</a:t>
             </a:r>
-            <a:r>
-              <a:rPr lang="en-US"/>
-              <a:t>knowledge appears</a:t>
-            </a:r>
-            <a:endParaRPr lang="en-US" dirty="0"/>
           </a:p>
         </p:txBody>
       </p:sp>
@@ -29000,13 +28995,8 @@
           <a:p>
             <a:r>
               <a:rPr lang="en-US" sz="2000" dirty="0"/>
-              <a:t>How do we address focus? A human only focuses on a small part of any </a:t>
+              <a:t>How do we address focus? A human only focuses on a small part of any visual scene.</a:t>
             </a:r>
-            <a:r>
-              <a:rPr lang="en-US" sz="2000"/>
-              <a:t>visual scene.</a:t>
-            </a:r>
-            <a:endParaRPr lang="en-US" sz="2000" dirty="0"/>
           </a:p>
         </p:txBody>
       </p:sp>

</xml_diff>